<commit_message>
title slide and FAIR deck
</commit_message>
<xml_diff>
--- a/presentations/CheapAndFAIRIntro.pptx
+++ b/presentations/CheapAndFAIRIntro.pptx
@@ -6221,7 +6221,7 @@
         </p:nvSpPr>
         <p:spPr>
           <a:xfrm>
-            <a:off x="228600" y="377110"/>
+            <a:off x="228600" y="15603"/>
             <a:ext cx="11201399" cy="2518490"/>
           </a:xfrm>
         </p:spPr>
@@ -6279,8 +6279,8 @@
         </p:nvSpPr>
         <p:spPr>
           <a:xfrm>
-            <a:off x="228601" y="3200400"/>
-            <a:ext cx="9677401" cy="2832798"/>
+            <a:off x="76200" y="4191000"/>
+            <a:ext cx="9677401" cy="2518490"/>
           </a:xfrm>
         </p:spPr>
         <p:txBody>
@@ -6309,19 +6309,17 @@
               </a:rPr>
             </a:br>
             <a:r>
-              <a:rPr lang="en-US" sz="2800" dirty="0">
+              <a:rPr lang="en-US" sz="2800" b="0" dirty="0">
                 <a:solidFill>
                   <a:schemeClr val="bg1">
                     <a:lumMod val="85000"/>
                   </a:schemeClr>
                 </a:solidFill>
               </a:rPr>
-              <a:t>SDSC</a:t>
-            </a:r>
-          </a:p>
-          <a:p>
+              <a:t>zonca@sdsc.edu &amp; rick@sdsc.edu</a:t>
+            </a:r>
             <a:br>
-              <a:rPr lang="en-US" sz="2800" dirty="0">
+              <a:rPr lang="en-US" sz="2800" b="0" dirty="0">
                 <a:solidFill>
                   <a:schemeClr val="bg1">
                     <a:lumMod val="85000"/>
@@ -6337,7 +6335,94 @@
                   </a:schemeClr>
                 </a:solidFill>
               </a:rPr>
+              <a:t>SDSC</a:t>
+            </a:r>
+          </a:p>
+          <a:p>
+            <a:br>
+              <a:rPr lang="en-US" sz="2800" dirty="0">
+                <a:solidFill>
+                  <a:schemeClr val="bg1">
+                    <a:lumMod val="85000"/>
+                  </a:schemeClr>
+                </a:solidFill>
+              </a:rPr>
+            </a:br>
+            <a:r>
+              <a:rPr lang="en-US" sz="2800" dirty="0">
+                <a:solidFill>
+                  <a:schemeClr val="bg1">
+                    <a:lumMod val="85000"/>
+                  </a:schemeClr>
+                </a:solidFill>
+              </a:rPr>
               <a:t>Gateways 2024, September 30, 2024, Online</a:t>
+            </a:r>
+          </a:p>
+        </p:txBody>
+      </p:sp>
+      <p:sp>
+        <p:nvSpPr>
+          <p:cNvPr id="6" name="Title 18">
+            <a:extLst>
+              <a:ext uri="{FF2B5EF4-FFF2-40B4-BE49-F238E27FC236}">
+                <a16:creationId xmlns:a16="http://schemas.microsoft.com/office/drawing/2014/main" id="{49B51FDC-691B-3285-70F4-4440E4E0ADFE}"/>
+              </a:ext>
+            </a:extLst>
+          </p:cNvPr>
+          <p:cNvSpPr txBox="1">
+            <a:spLocks/>
+          </p:cNvSpPr>
+          <p:nvPr/>
+        </p:nvSpPr>
+        <p:spPr>
+          <a:xfrm>
+            <a:off x="228600" y="1871311"/>
+            <a:ext cx="5562600" cy="1325563"/>
+          </a:xfrm>
+          <a:prstGeom prst="rect">
+            <a:avLst/>
+          </a:prstGeom>
+        </p:spPr>
+        <p:txBody>
+          <a:bodyPr vert="horz" lIns="91440" tIns="45720" rIns="91440" bIns="45720" rtlCol="0" anchor="ctr">
+            <a:noAutofit/>
+          </a:bodyPr>
+          <a:lstStyle>
+            <a:lvl1pPr algn="l" defTabSz="914400" rtl="0" eaLnBrk="1" latinLnBrk="0" hangingPunct="1">
+              <a:lnSpc>
+                <a:spcPct val="70000"/>
+              </a:lnSpc>
+              <a:spcBef>
+                <a:spcPts val="0"/>
+              </a:spcBef>
+              <a:buNone/>
+              <a:defRPr sz="8800" b="1" kern="1200">
+                <a:solidFill>
+                  <a:schemeClr val="bg1"/>
+                </a:solidFill>
+                <a:latin typeface="Teko SemiBold" panose="02000000000000000000" pitchFamily="2" charset="0"/>
+                <a:ea typeface="+mj-ea"/>
+                <a:cs typeface="Teko SemiBold" panose="02000000000000000000" pitchFamily="2" charset="0"/>
+              </a:defRPr>
+            </a:lvl1pPr>
+          </a:lstStyle>
+          <a:p>
+            <a:pPr fontAlgn="auto">
+              <a:spcAft>
+                <a:spcPts val="0"/>
+              </a:spcAft>
+            </a:pPr>
+            <a:r>
+              <a:rPr lang="en-US" sz="6000" b="0" i="0" dirty="0">
+                <a:solidFill>
+                  <a:schemeClr val="accent2"/>
+                </a:solidFill>
+                <a:latin typeface="Source Sans Pro" panose="020B0503030403020204" pitchFamily="34" charset="77"/>
+                <a:ea typeface="+mn-ea"/>
+                <a:cs typeface="+mn-cs"/>
+              </a:rPr>
+              <a:t>Introduction</a:t>
             </a:r>
           </a:p>
         </p:txBody>

</xml_diff>